<commit_message>
added absolute position example.
</commit_message>
<xml_diff>
--- a/doc/css-learning.pptx
+++ b/doc/css-learning.pptx
@@ -5,13 +5,14 @@
     <p:sldMasterId id="2147483648" r:id="rId1"/>
   </p:sldMasterIdLst>
   <p:notesMasterIdLst>
-    <p:notesMasterId r:id="rId6"/>
+    <p:notesMasterId r:id="rId7"/>
   </p:notesMasterIdLst>
   <p:sldIdLst>
     <p:sldId id="256" r:id="rId2"/>
     <p:sldId id="258" r:id="rId3"/>
     <p:sldId id="257" r:id="rId4"/>
     <p:sldId id="259" r:id="rId5"/>
+    <p:sldId id="260" r:id="rId6"/>
   </p:sldIdLst>
   <p:sldSz cx="9144000" cy="6858000" type="screen4x3"/>
   <p:notesSz cx="6858000" cy="9144000"/>
@@ -195,7 +196,7 @@
           <a:p>
             <a:fld id="{95B47478-B6F8-44A9-BE24-483D8EEEC221}" type="datetimeFigureOut">
               <a:rPr lang="zh-CN" altLang="en-US" smtClean="0"/>
-              <a:t>2017/4/17</a:t>
+              <a:t>2017/4/18</a:t>
             </a:fld>
             <a:endParaRPr lang="zh-CN" altLang="en-US"/>
           </a:p>
@@ -842,7 +843,7 @@
           <a:p>
             <a:fld id="{530820CF-B880-4189-942D-D702A7CBA730}" type="datetimeFigureOut">
               <a:rPr lang="zh-CN" altLang="en-US" smtClean="0"/>
-              <a:t>2017/4/17</a:t>
+              <a:t>2017/4/18</a:t>
             </a:fld>
             <a:endParaRPr lang="zh-CN" altLang="en-US"/>
           </a:p>
@@ -1007,7 +1008,7 @@
           <a:p>
             <a:fld id="{530820CF-B880-4189-942D-D702A7CBA730}" type="datetimeFigureOut">
               <a:rPr lang="zh-CN" altLang="en-US" smtClean="0"/>
-              <a:t>2017/4/17</a:t>
+              <a:t>2017/4/18</a:t>
             </a:fld>
             <a:endParaRPr lang="zh-CN" altLang="en-US"/>
           </a:p>
@@ -1182,7 +1183,7 @@
           <a:p>
             <a:fld id="{530820CF-B880-4189-942D-D702A7CBA730}" type="datetimeFigureOut">
               <a:rPr lang="zh-CN" altLang="en-US" smtClean="0"/>
-              <a:t>2017/4/17</a:t>
+              <a:t>2017/4/18</a:t>
             </a:fld>
             <a:endParaRPr lang="zh-CN" altLang="en-US"/>
           </a:p>
@@ -1347,7 +1348,7 @@
           <a:p>
             <a:fld id="{530820CF-B880-4189-942D-D702A7CBA730}" type="datetimeFigureOut">
               <a:rPr lang="zh-CN" altLang="en-US" smtClean="0"/>
-              <a:t>2017/4/17</a:t>
+              <a:t>2017/4/18</a:t>
             </a:fld>
             <a:endParaRPr lang="zh-CN" altLang="en-US"/>
           </a:p>
@@ -1588,7 +1589,7 @@
           <a:p>
             <a:fld id="{530820CF-B880-4189-942D-D702A7CBA730}" type="datetimeFigureOut">
               <a:rPr lang="zh-CN" altLang="en-US" smtClean="0"/>
-              <a:t>2017/4/17</a:t>
+              <a:t>2017/4/18</a:t>
             </a:fld>
             <a:endParaRPr lang="zh-CN" altLang="en-US"/>
           </a:p>
@@ -1871,7 +1872,7 @@
           <a:p>
             <a:fld id="{530820CF-B880-4189-942D-D702A7CBA730}" type="datetimeFigureOut">
               <a:rPr lang="zh-CN" altLang="en-US" smtClean="0"/>
-              <a:t>2017/4/17</a:t>
+              <a:t>2017/4/18</a:t>
             </a:fld>
             <a:endParaRPr lang="zh-CN" altLang="en-US"/>
           </a:p>
@@ -2288,7 +2289,7 @@
           <a:p>
             <a:fld id="{530820CF-B880-4189-942D-D702A7CBA730}" type="datetimeFigureOut">
               <a:rPr lang="zh-CN" altLang="en-US" smtClean="0"/>
-              <a:t>2017/4/17</a:t>
+              <a:t>2017/4/18</a:t>
             </a:fld>
             <a:endParaRPr lang="zh-CN" altLang="en-US"/>
           </a:p>
@@ -2401,7 +2402,7 @@
           <a:p>
             <a:fld id="{530820CF-B880-4189-942D-D702A7CBA730}" type="datetimeFigureOut">
               <a:rPr lang="zh-CN" altLang="en-US" smtClean="0"/>
-              <a:t>2017/4/17</a:t>
+              <a:t>2017/4/18</a:t>
             </a:fld>
             <a:endParaRPr lang="zh-CN" altLang="en-US"/>
           </a:p>
@@ -2491,7 +2492,7 @@
           <a:p>
             <a:fld id="{530820CF-B880-4189-942D-D702A7CBA730}" type="datetimeFigureOut">
               <a:rPr lang="zh-CN" altLang="en-US" smtClean="0"/>
-              <a:t>2017/4/17</a:t>
+              <a:t>2017/4/18</a:t>
             </a:fld>
             <a:endParaRPr lang="zh-CN" altLang="en-US"/>
           </a:p>
@@ -2763,7 +2764,7 @@
           <a:p>
             <a:fld id="{530820CF-B880-4189-942D-D702A7CBA730}" type="datetimeFigureOut">
               <a:rPr lang="zh-CN" altLang="en-US" smtClean="0"/>
-              <a:t>2017/4/17</a:t>
+              <a:t>2017/4/18</a:t>
             </a:fld>
             <a:endParaRPr lang="zh-CN" altLang="en-US"/>
           </a:p>
@@ -3011,7 +3012,7 @@
           <a:p>
             <a:fld id="{530820CF-B880-4189-942D-D702A7CBA730}" type="datetimeFigureOut">
               <a:rPr lang="zh-CN" altLang="en-US" smtClean="0"/>
-              <a:t>2017/4/17</a:t>
+              <a:t>2017/4/18</a:t>
             </a:fld>
             <a:endParaRPr lang="zh-CN" altLang="en-US"/>
           </a:p>
@@ -3219,7 +3220,7 @@
           <a:p>
             <a:fld id="{530820CF-B880-4189-942D-D702A7CBA730}" type="datetimeFigureOut">
               <a:rPr lang="zh-CN" altLang="en-US" smtClean="0"/>
-              <a:t>2017/4/17</a:t>
+              <a:t>2017/4/18</a:t>
             </a:fld>
             <a:endParaRPr lang="zh-CN" altLang="en-US"/>
           </a:p>
@@ -4107,6 +4108,104 @@
     <p:extLst>
       <p:ext uri="{BB962C8B-B14F-4D97-AF65-F5344CB8AC3E}">
         <p14:creationId xmlns:p14="http://schemas.microsoft.com/office/powerpoint/2010/main" val="3552057590"/>
+      </p:ext>
+    </p:extLst>
+  </p:cSld>
+  <p:clrMapOvr>
+    <a:masterClrMapping/>
+  </p:clrMapOvr>
+</p:sld>
+</file>
+
+<file path=ppt/slides/slide5.xml><?xml version="1.0" encoding="utf-8"?>
+<p:sld xmlns:a="http://schemas.openxmlformats.org/drawingml/2006/main" xmlns:r="http://schemas.openxmlformats.org/officeDocument/2006/relationships" xmlns:p="http://schemas.openxmlformats.org/presentationml/2006/main">
+  <p:cSld>
+    <p:spTree>
+      <p:nvGrpSpPr>
+        <p:cNvPr id="1" name=""/>
+        <p:cNvGrpSpPr/>
+        <p:nvPr/>
+      </p:nvGrpSpPr>
+      <p:grpSpPr>
+        <a:xfrm>
+          <a:off x="0" y="0"/>
+          <a:ext cx="0" cy="0"/>
+          <a:chOff x="0" y="0"/>
+          <a:chExt cx="0" cy="0"/>
+        </a:xfrm>
+      </p:grpSpPr>
+      <p:sp>
+        <p:nvSpPr>
+          <p:cNvPr id="2" name="标题 1"/>
+          <p:cNvSpPr>
+            <a:spLocks noGrp="1"/>
+          </p:cNvSpPr>
+          <p:nvPr>
+            <p:ph type="title"/>
+          </p:nvPr>
+        </p:nvSpPr>
+        <p:spPr/>
+        <p:txBody>
+          <a:bodyPr/>
+          <a:lstStyle/>
+          <a:p>
+            <a:r>
+              <a:rPr lang="zh-CN" altLang="en-US" dirty="0" smtClean="0"/>
+              <a:t>响应式布局</a:t>
+            </a:r>
+            <a:endParaRPr lang="zh-CN" altLang="en-US" dirty="0"/>
+          </a:p>
+        </p:txBody>
+      </p:sp>
+      <p:sp>
+        <p:nvSpPr>
+          <p:cNvPr id="3" name="内容占位符 2"/>
+          <p:cNvSpPr>
+            <a:spLocks noGrp="1"/>
+          </p:cNvSpPr>
+          <p:nvPr>
+            <p:ph idx="1"/>
+          </p:nvPr>
+        </p:nvSpPr>
+        <p:spPr/>
+        <p:txBody>
+          <a:bodyPr/>
+          <a:lstStyle/>
+          <a:p>
+            <a:r>
+              <a:rPr lang="en-US" altLang="zh-CN" dirty="0" smtClean="0"/>
+              <a:t>Meta</a:t>
+            </a:r>
+            <a:r>
+              <a:rPr lang="zh-CN" altLang="en-US" dirty="0" smtClean="0"/>
+              <a:t>的</a:t>
+            </a:r>
+            <a:r>
+              <a:rPr lang="en-US" altLang="zh-CN" dirty="0" smtClean="0"/>
+              <a:t>viewport</a:t>
+            </a:r>
+          </a:p>
+          <a:p>
+            <a:r>
+              <a:rPr lang="en-US" altLang="zh-CN" dirty="0" err="1" smtClean="0"/>
+              <a:t>Css</a:t>
+            </a:r>
+            <a:r>
+              <a:rPr lang="zh-CN" altLang="en-US" dirty="0" smtClean="0"/>
+              <a:t>中的</a:t>
+            </a:r>
+            <a:r>
+              <a:rPr lang="en-US" altLang="zh-CN" smtClean="0"/>
+              <a:t>media query</a:t>
+            </a:r>
+            <a:endParaRPr lang="zh-CN" altLang="en-US" dirty="0"/>
+          </a:p>
+        </p:txBody>
+      </p:sp>
+    </p:spTree>
+    <p:extLst>
+      <p:ext uri="{BB962C8B-B14F-4D97-AF65-F5344CB8AC3E}">
+        <p14:creationId xmlns:p14="http://schemas.microsoft.com/office/powerpoint/2010/main" val="4203734902"/>
       </p:ext>
     </p:extLst>
   </p:cSld>

</xml_diff>